<commit_message>
apresentação já deve estar linda
</commit_message>
<xml_diff>
--- a/Relatório e Apresentação Intercalar #2/MusicStats.pptx
+++ b/Relatório e Apresentação Intercalar #2/MusicStats.pptx
@@ -5,7 +5,7 @@
     <p:sldMasterId id="2147483648" r:id="rId1"/>
   </p:sldMasterIdLst>
   <p:notesMasterIdLst>
-    <p:notesMasterId r:id="rId14"/>
+    <p:notesMasterId r:id="rId17"/>
   </p:notesMasterIdLst>
   <p:sldIdLst>
     <p:sldId id="257" r:id="rId2"/>
@@ -20,6 +20,9 @@
     <p:sldId id="268" r:id="rId11"/>
     <p:sldId id="269" r:id="rId12"/>
     <p:sldId id="260" r:id="rId13"/>
+    <p:sldId id="270" r:id="rId14"/>
+    <p:sldId id="271" r:id="rId15"/>
+    <p:sldId id="272" r:id="rId16"/>
   </p:sldIdLst>
   <p:sldSz cx="9144000" cy="6858000" type="screen4x3"/>
   <p:notesSz cx="6858000" cy="9144000"/>
@@ -692,6 +695,194 @@
 </p:notes>
 </file>
 
+<file path=ppt/notesSlides/notesSlide11.xml><?xml version="1.0" encoding="utf-8"?>
+<p:notes xmlns:a="http://schemas.openxmlformats.org/drawingml/2006/main" xmlns:r="http://schemas.openxmlformats.org/officeDocument/2006/relationships" xmlns:p="http://schemas.openxmlformats.org/presentationml/2006/main">
+  <p:cSld>
+    <p:spTree>
+      <p:nvGrpSpPr>
+        <p:cNvPr id="1" name=""/>
+        <p:cNvGrpSpPr/>
+        <p:nvPr/>
+      </p:nvGrpSpPr>
+      <p:grpSpPr>
+        <a:xfrm>
+          <a:off x="0" y="0"/>
+          <a:ext cx="0" cy="0"/>
+          <a:chOff x="0" y="0"/>
+          <a:chExt cx="0" cy="0"/>
+        </a:xfrm>
+      </p:grpSpPr>
+      <p:sp>
+        <p:nvSpPr>
+          <p:cNvPr id="2" name="Marcador de Posição da Imagem do Diapositivo 1"/>
+          <p:cNvSpPr>
+            <a:spLocks noGrp="1" noRot="1" noChangeAspect="1"/>
+          </p:cNvSpPr>
+          <p:nvPr>
+            <p:ph type="sldImg"/>
+          </p:nvPr>
+        </p:nvSpPr>
+        <p:spPr/>
+      </p:sp>
+      <p:sp>
+        <p:nvSpPr>
+          <p:cNvPr id="3" name="Marcador de Posição de Notas 2"/>
+          <p:cNvSpPr>
+            <a:spLocks noGrp="1"/>
+          </p:cNvSpPr>
+          <p:nvPr>
+            <p:ph type="body" idx="1"/>
+          </p:nvPr>
+        </p:nvSpPr>
+        <p:spPr/>
+        <p:txBody>
+          <a:bodyPr/>
+          <a:lstStyle/>
+          <a:p>
+            <a:r>
+              <a:rPr lang="pt-PT" dirty="0" smtClean="0"/>
+              <a:t>Exemplo</a:t>
+            </a:r>
+            <a:r>
+              <a:rPr lang="pt-PT" baseline="0" dirty="0" smtClean="0"/>
+              <a:t> de pesquisa de “Amor” sobre um excerto do nosso </a:t>
+            </a:r>
+            <a:r>
+              <a:rPr lang="pt-PT" baseline="0" dirty="0" err="1" smtClean="0"/>
+              <a:t>dataset</a:t>
+            </a:r>
+            <a:endParaRPr lang="pt-PT" dirty="0"/>
+          </a:p>
+        </p:txBody>
+      </p:sp>
+      <p:sp>
+        <p:nvSpPr>
+          <p:cNvPr id="4" name="Marcador de Posição do Número do Diapositivo 3"/>
+          <p:cNvSpPr>
+            <a:spLocks noGrp="1"/>
+          </p:cNvSpPr>
+          <p:nvPr>
+            <p:ph type="sldNum" sz="quarter" idx="10"/>
+          </p:nvPr>
+        </p:nvSpPr>
+        <p:spPr/>
+        <p:txBody>
+          <a:bodyPr/>
+          <a:lstStyle/>
+          <a:p>
+            <a:fld id="{4719AE1C-3E5E-4042-B45E-B0558C8CFED1}" type="slidenum">
+              <a:rPr lang="pt-PT" smtClean="0"/>
+              <a:t>13</a:t>
+            </a:fld>
+            <a:endParaRPr lang="pt-PT"/>
+          </a:p>
+        </p:txBody>
+      </p:sp>
+    </p:spTree>
+    <p:extLst>
+      <p:ext uri="{BB962C8B-B14F-4D97-AF65-F5344CB8AC3E}">
+        <p14:creationId xmlns:p14="http://schemas.microsoft.com/office/powerpoint/2010/main" val="473377844"/>
+      </p:ext>
+    </p:extLst>
+  </p:cSld>
+  <p:clrMapOvr>
+    <a:masterClrMapping/>
+  </p:clrMapOvr>
+</p:notes>
+</file>
+
+<file path=ppt/notesSlides/notesSlide12.xml><?xml version="1.0" encoding="utf-8"?>
+<p:notes xmlns:a="http://schemas.openxmlformats.org/drawingml/2006/main" xmlns:r="http://schemas.openxmlformats.org/officeDocument/2006/relationships" xmlns:p="http://schemas.openxmlformats.org/presentationml/2006/main">
+  <p:cSld>
+    <p:spTree>
+      <p:nvGrpSpPr>
+        <p:cNvPr id="1" name=""/>
+        <p:cNvGrpSpPr/>
+        <p:nvPr/>
+      </p:nvGrpSpPr>
+      <p:grpSpPr>
+        <a:xfrm>
+          <a:off x="0" y="0"/>
+          <a:ext cx="0" cy="0"/>
+          <a:chOff x="0" y="0"/>
+          <a:chExt cx="0" cy="0"/>
+        </a:xfrm>
+      </p:grpSpPr>
+      <p:sp>
+        <p:nvSpPr>
+          <p:cNvPr id="2" name="Marcador de Posição da Imagem do Diapositivo 1"/>
+          <p:cNvSpPr>
+            <a:spLocks noGrp="1" noRot="1" noChangeAspect="1"/>
+          </p:cNvSpPr>
+          <p:nvPr>
+            <p:ph type="sldImg"/>
+          </p:nvPr>
+        </p:nvSpPr>
+        <p:spPr/>
+      </p:sp>
+      <p:sp>
+        <p:nvSpPr>
+          <p:cNvPr id="3" name="Marcador de Posição de Notas 2"/>
+          <p:cNvSpPr>
+            <a:spLocks noGrp="1"/>
+          </p:cNvSpPr>
+          <p:nvPr>
+            <p:ph type="body" idx="1"/>
+          </p:nvPr>
+        </p:nvSpPr>
+        <p:spPr/>
+        <p:txBody>
+          <a:bodyPr/>
+          <a:lstStyle/>
+          <a:p>
+            <a:r>
+              <a:rPr lang="pt-PT" dirty="0" smtClean="0"/>
+              <a:t>Assim que terminada</a:t>
+            </a:r>
+            <a:r>
+              <a:rPr lang="pt-PT" baseline="0" dirty="0" smtClean="0"/>
+              <a:t> a interface gráfica será possível pesquisar por artista, género ou tema</a:t>
+            </a:r>
+            <a:endParaRPr lang="pt-PT" dirty="0"/>
+          </a:p>
+        </p:txBody>
+      </p:sp>
+      <p:sp>
+        <p:nvSpPr>
+          <p:cNvPr id="4" name="Marcador de Posição do Número do Diapositivo 3"/>
+          <p:cNvSpPr>
+            <a:spLocks noGrp="1"/>
+          </p:cNvSpPr>
+          <p:nvPr>
+            <p:ph type="sldNum" sz="quarter" idx="10"/>
+          </p:nvPr>
+        </p:nvSpPr>
+        <p:spPr/>
+        <p:txBody>
+          <a:bodyPr/>
+          <a:lstStyle/>
+          <a:p>
+            <a:fld id="{4719AE1C-3E5E-4042-B45E-B0558C8CFED1}" type="slidenum">
+              <a:rPr lang="pt-PT" smtClean="0"/>
+              <a:t>14</a:t>
+            </a:fld>
+            <a:endParaRPr lang="pt-PT"/>
+          </a:p>
+        </p:txBody>
+      </p:sp>
+    </p:spTree>
+    <p:extLst>
+      <p:ext uri="{BB962C8B-B14F-4D97-AF65-F5344CB8AC3E}">
+        <p14:creationId xmlns:p14="http://schemas.microsoft.com/office/powerpoint/2010/main" val="1919938672"/>
+      </p:ext>
+    </p:extLst>
+  </p:cSld>
+  <p:clrMapOvr>
+    <a:masterClrMapping/>
+  </p:clrMapOvr>
+</p:notes>
+</file>
+
 <file path=ppt/notesSlides/notesSlide2.xml><?xml version="1.0" encoding="utf-8"?>
 <p:notes xmlns:a="http://schemas.openxmlformats.org/drawingml/2006/main" xmlns:r="http://schemas.openxmlformats.org/officeDocument/2006/relationships" xmlns:p="http://schemas.openxmlformats.org/presentationml/2006/main">
   <p:cSld>
@@ -1557,13 +1748,9 @@
             </a:r>
             <a:r>
               <a:rPr lang="pt-PT" baseline="0" dirty="0" smtClean="0"/>
-              <a:t> com as vendas </a:t>
-            </a:r>
-            <a:r>
-              <a:rPr lang="pt-PT" baseline="0" smtClean="0"/>
-              <a:t>do álbum</a:t>
-            </a:r>
-            <a:endParaRPr lang="pt-PT"/>
+              <a:t> com as vendas do álbum</a:t>
+            </a:r>
+            <a:endParaRPr lang="pt-PT" dirty="0"/>
           </a:p>
         </p:txBody>
       </p:sp>
@@ -5579,6 +5766,864 @@
 </p:sld>
 </file>
 
+<file path=ppt/slides/slide13.xml><?xml version="1.0" encoding="utf-8"?>
+<p:sld xmlns:a="http://schemas.openxmlformats.org/drawingml/2006/main" xmlns:r="http://schemas.openxmlformats.org/officeDocument/2006/relationships" xmlns:p="http://schemas.openxmlformats.org/presentationml/2006/main">
+  <p:cSld>
+    <p:spTree>
+      <p:nvGrpSpPr>
+        <p:cNvPr id="1" name=""/>
+        <p:cNvGrpSpPr/>
+        <p:nvPr/>
+      </p:nvGrpSpPr>
+      <p:grpSpPr>
+        <a:xfrm>
+          <a:off x="0" y="0"/>
+          <a:ext cx="0" cy="0"/>
+          <a:chOff x="0" y="0"/>
+          <a:chExt cx="0" cy="0"/>
+        </a:xfrm>
+      </p:grpSpPr>
+      <p:pic>
+        <p:nvPicPr>
+          <p:cNvPr id="4" name="Picture 3" descr="C:\Users\Luis\Desktop\Sem Título12.png"/>
+          <p:cNvPicPr>
+            <a:picLocks noChangeAspect="1" noChangeArrowheads="1"/>
+          </p:cNvPicPr>
+          <p:nvPr/>
+        </p:nvPicPr>
+        <p:blipFill rotWithShape="1">
+          <a:blip r:embed="rId3">
+            <a:extLst>
+              <a:ext uri="{28A0092B-C50C-407E-A947-70E740481C1C}">
+                <a14:useLocalDpi xmlns:a14="http://schemas.microsoft.com/office/drawing/2010/main" val="0"/>
+              </a:ext>
+            </a:extLst>
+          </a:blip>
+          <a:srcRect l="1" t="47103" r="62259" b="7068"/>
+          <a:stretch/>
+        </p:blipFill>
+        <p:spPr bwMode="auto">
+          <a:xfrm>
+            <a:off x="0" y="1"/>
+            <a:ext cx="9036496" cy="6858000"/>
+          </a:xfrm>
+          <a:prstGeom prst="rect">
+            <a:avLst/>
+          </a:prstGeom>
+          <a:noFill/>
+          <a:extLst>
+            <a:ext uri="{909E8E84-426E-40DD-AFC4-6F175D3DCCD1}">
+              <a14:hiddenFill xmlns:a14="http://schemas.microsoft.com/office/drawing/2010/main">
+                <a:solidFill>
+                  <a:srgbClr val="FFFFFF"/>
+                </a:solidFill>
+              </a14:hiddenFill>
+            </a:ext>
+          </a:extLst>
+        </p:spPr>
+      </p:pic>
+      <p:sp>
+        <p:nvSpPr>
+          <p:cNvPr id="6" name="CaixaDeTexto 5"/>
+          <p:cNvSpPr txBox="1"/>
+          <p:nvPr/>
+        </p:nvSpPr>
+        <p:spPr>
+          <a:xfrm>
+            <a:off x="6588224" y="4221088"/>
+            <a:ext cx="2143536" cy="923330"/>
+          </a:xfrm>
+          <a:prstGeom prst="rect">
+            <a:avLst/>
+          </a:prstGeom>
+          <a:noFill/>
+        </p:spPr>
+        <p:txBody>
+          <a:bodyPr wrap="none" rtlCol="0">
+            <a:spAutoFit/>
+          </a:bodyPr>
+          <a:lstStyle/>
+          <a:p>
+            <a:r>
+              <a:rPr lang="pt-PT" sz="4000" dirty="0" smtClean="0">
+                <a:effectLst>
+                  <a:outerShdw blurRad="38100" dist="38100" dir="2700000" algn="tl">
+                    <a:srgbClr val="000000">
+                      <a:alpha val="43137"/>
+                    </a:srgbClr>
+                  </a:outerShdw>
+                </a:effectLst>
+                <a:latin typeface="Helvetica35-Thin" pitchFamily="34" charset="0"/>
+              </a:rPr>
+              <a:t>“</a:t>
+            </a:r>
+            <a:r>
+              <a:rPr lang="pt-PT" sz="5400" dirty="0" smtClean="0">
+                <a:effectLst>
+                  <a:outerShdw blurRad="38100" dist="38100" dir="2700000" algn="tl">
+                    <a:srgbClr val="000000">
+                      <a:alpha val="43137"/>
+                    </a:srgbClr>
+                  </a:outerShdw>
+                </a:effectLst>
+                <a:latin typeface="Helvetica35-Thin" pitchFamily="34" charset="0"/>
+              </a:rPr>
+              <a:t>LOVE</a:t>
+            </a:r>
+            <a:r>
+              <a:rPr lang="pt-PT" sz="4000" dirty="0" smtClean="0">
+                <a:effectLst>
+                  <a:outerShdw blurRad="38100" dist="38100" dir="2700000" algn="tl">
+                    <a:srgbClr val="000000">
+                      <a:alpha val="43137"/>
+                    </a:srgbClr>
+                  </a:outerShdw>
+                </a:effectLst>
+                <a:latin typeface="Helvetica35-Thin" pitchFamily="34" charset="0"/>
+              </a:rPr>
+              <a:t>”</a:t>
+            </a:r>
+            <a:endParaRPr lang="pt-PT" sz="4000" dirty="0">
+              <a:effectLst>
+                <a:outerShdw blurRad="38100" dist="38100" dir="2700000" algn="tl">
+                  <a:srgbClr val="000000">
+                    <a:alpha val="43137"/>
+                  </a:srgbClr>
+                </a:outerShdw>
+              </a:effectLst>
+              <a:latin typeface="Helvetica35-Thin" pitchFamily="34" charset="0"/>
+            </a:endParaRPr>
+          </a:p>
+        </p:txBody>
+      </p:sp>
+    </p:spTree>
+    <p:extLst>
+      <p:ext uri="{BB962C8B-B14F-4D97-AF65-F5344CB8AC3E}">
+        <p14:creationId xmlns:p14="http://schemas.microsoft.com/office/powerpoint/2010/main" val="3054012823"/>
+      </p:ext>
+    </p:extLst>
+  </p:cSld>
+  <p:clrMapOvr>
+    <a:masterClrMapping/>
+  </p:clrMapOvr>
+  <p:timing>
+    <p:tnLst>
+      <p:par>
+        <p:cTn id="1" dur="indefinite" restart="never" nodeType="tmRoot"/>
+      </p:par>
+    </p:tnLst>
+  </p:timing>
+</p:sld>
+</file>
+
+<file path=ppt/slides/slide14.xml><?xml version="1.0" encoding="utf-8"?>
+<p:sld xmlns:a="http://schemas.openxmlformats.org/drawingml/2006/main" xmlns:r="http://schemas.openxmlformats.org/officeDocument/2006/relationships" xmlns:p="http://schemas.openxmlformats.org/presentationml/2006/main">
+  <p:cSld>
+    <p:spTree>
+      <p:nvGrpSpPr>
+        <p:cNvPr id="1" name=""/>
+        <p:cNvGrpSpPr/>
+        <p:nvPr/>
+      </p:nvGrpSpPr>
+      <p:grpSpPr>
+        <a:xfrm>
+          <a:off x="0" y="0"/>
+          <a:ext cx="0" cy="0"/>
+          <a:chOff x="0" y="0"/>
+          <a:chExt cx="0" cy="0"/>
+        </a:xfrm>
+      </p:grpSpPr>
+      <p:pic>
+        <p:nvPicPr>
+          <p:cNvPr id="4" name="Picture 3" descr="C:\Users\Luis\Desktop\Sem Título12.png"/>
+          <p:cNvPicPr>
+            <a:picLocks noChangeAspect="1" noChangeArrowheads="1"/>
+          </p:cNvPicPr>
+          <p:nvPr/>
+        </p:nvPicPr>
+        <p:blipFill rotWithShape="1">
+          <a:blip r:embed="rId3">
+            <a:extLst>
+              <a:ext uri="{28A0092B-C50C-407E-A947-70E740481C1C}">
+                <a14:useLocalDpi xmlns:a14="http://schemas.microsoft.com/office/drawing/2010/main" val="0"/>
+              </a:ext>
+            </a:extLst>
+          </a:blip>
+          <a:srcRect l="1" t="47103" r="62259" b="7068"/>
+          <a:stretch/>
+        </p:blipFill>
+        <p:spPr bwMode="auto">
+          <a:xfrm>
+            <a:off x="0" y="1"/>
+            <a:ext cx="9036496" cy="6858000"/>
+          </a:xfrm>
+          <a:prstGeom prst="rect">
+            <a:avLst/>
+          </a:prstGeom>
+          <a:noFill/>
+          <a:extLst>
+            <a:ext uri="{909E8E84-426E-40DD-AFC4-6F175D3DCCD1}">
+              <a14:hiddenFill xmlns:a14="http://schemas.microsoft.com/office/drawing/2010/main">
+                <a:solidFill>
+                  <a:srgbClr val="FFFFFF"/>
+                </a:solidFill>
+              </a14:hiddenFill>
+            </a:ext>
+          </a:extLst>
+        </p:spPr>
+      </p:pic>
+      <p:sp>
+        <p:nvSpPr>
+          <p:cNvPr id="2" name="Rectângulo 1"/>
+          <p:cNvSpPr/>
+          <p:nvPr/>
+        </p:nvSpPr>
+        <p:spPr>
+          <a:xfrm>
+            <a:off x="899592" y="2805638"/>
+            <a:ext cx="8136904" cy="3143642"/>
+          </a:xfrm>
+          <a:prstGeom prst="rect">
+            <a:avLst/>
+          </a:prstGeom>
+          <a:solidFill>
+            <a:schemeClr val="bg1"/>
+          </a:solidFill>
+          <a:ln>
+            <a:solidFill>
+              <a:schemeClr val="bg1"/>
+            </a:solidFill>
+          </a:ln>
+        </p:spPr>
+        <p:style>
+          <a:lnRef idx="2">
+            <a:schemeClr val="accent1">
+              <a:shade val="50000"/>
+            </a:schemeClr>
+          </a:lnRef>
+          <a:fillRef idx="1">
+            <a:schemeClr val="accent1"/>
+          </a:fillRef>
+          <a:effectRef idx="0">
+            <a:schemeClr val="accent1"/>
+          </a:effectRef>
+          <a:fontRef idx="minor">
+            <a:schemeClr val="lt1"/>
+          </a:fontRef>
+        </p:style>
+        <p:txBody>
+          <a:bodyPr rtlCol="0" anchor="ctr"/>
+          <a:lstStyle/>
+          <a:p>
+            <a:pPr algn="ctr"/>
+            <a:endParaRPr lang="pt-PT"/>
+          </a:p>
+        </p:txBody>
+      </p:sp>
+      <p:sp>
+        <p:nvSpPr>
+          <p:cNvPr id="6" name="CaixaDeTexto 5"/>
+          <p:cNvSpPr txBox="1"/>
+          <p:nvPr/>
+        </p:nvSpPr>
+        <p:spPr>
+          <a:xfrm>
+            <a:off x="4784510" y="3244864"/>
+            <a:ext cx="1611339" cy="707886"/>
+          </a:xfrm>
+          <a:prstGeom prst="rect">
+            <a:avLst/>
+          </a:prstGeom>
+          <a:noFill/>
+        </p:spPr>
+        <p:txBody>
+          <a:bodyPr wrap="none" rtlCol="0">
+            <a:spAutoFit/>
+          </a:bodyPr>
+          <a:lstStyle/>
+          <a:p>
+            <a:r>
+              <a:rPr lang="pt-PT" sz="4000" dirty="0" smtClean="0">
+                <a:effectLst>
+                  <a:outerShdw blurRad="38100" dist="38100" dir="2700000" algn="tl">
+                    <a:srgbClr val="000000">
+                      <a:alpha val="43137"/>
+                    </a:srgbClr>
+                  </a:outerShdw>
+                </a:effectLst>
+                <a:latin typeface="Helvetica35-Thin" pitchFamily="34" charset="0"/>
+              </a:rPr>
+              <a:t>“GOD”</a:t>
+            </a:r>
+            <a:endParaRPr lang="pt-PT" sz="4000" dirty="0">
+              <a:effectLst>
+                <a:outerShdw blurRad="38100" dist="38100" dir="2700000" algn="tl">
+                  <a:srgbClr val="000000">
+                    <a:alpha val="43137"/>
+                  </a:srgbClr>
+                </a:outerShdw>
+              </a:effectLst>
+              <a:latin typeface="Helvetica35-Thin" pitchFamily="34" charset="0"/>
+            </a:endParaRPr>
+          </a:p>
+        </p:txBody>
+      </p:sp>
+      <p:sp>
+        <p:nvSpPr>
+          <p:cNvPr id="5" name="CaixaDeTexto 4"/>
+          <p:cNvSpPr txBox="1"/>
+          <p:nvPr/>
+        </p:nvSpPr>
+        <p:spPr>
+          <a:xfrm>
+            <a:off x="4518248" y="4695527"/>
+            <a:ext cx="2990178" cy="707886"/>
+          </a:xfrm>
+          <a:prstGeom prst="rect">
+            <a:avLst/>
+          </a:prstGeom>
+          <a:noFill/>
+        </p:spPr>
+        <p:txBody>
+          <a:bodyPr wrap="none" rtlCol="0">
+            <a:spAutoFit/>
+          </a:bodyPr>
+          <a:lstStyle/>
+          <a:p>
+            <a:r>
+              <a:rPr lang="pt-PT" sz="4000" dirty="0" smtClean="0">
+                <a:effectLst>
+                  <a:outerShdw blurRad="38100" dist="38100" dir="2700000" algn="tl">
+                    <a:srgbClr val="000000">
+                      <a:alpha val="43137"/>
+                    </a:srgbClr>
+                  </a:outerShdw>
+                </a:effectLst>
+                <a:latin typeface="Helvetica35-Thin" pitchFamily="34" charset="0"/>
+              </a:rPr>
+              <a:t>“COLDPLAY”</a:t>
+            </a:r>
+            <a:endParaRPr lang="pt-PT" sz="4000" dirty="0">
+              <a:effectLst>
+                <a:outerShdw blurRad="38100" dist="38100" dir="2700000" algn="tl">
+                  <a:srgbClr val="000000">
+                    <a:alpha val="43137"/>
+                  </a:srgbClr>
+                </a:outerShdw>
+              </a:effectLst>
+              <a:latin typeface="Helvetica35-Thin" pitchFamily="34" charset="0"/>
+            </a:endParaRPr>
+          </a:p>
+        </p:txBody>
+      </p:sp>
+      <p:sp>
+        <p:nvSpPr>
+          <p:cNvPr id="7" name="CaixaDeTexto 6"/>
+          <p:cNvSpPr txBox="1"/>
+          <p:nvPr/>
+        </p:nvSpPr>
+        <p:spPr>
+          <a:xfrm>
+            <a:off x="1996416" y="4233862"/>
+            <a:ext cx="2143536" cy="923330"/>
+          </a:xfrm>
+          <a:prstGeom prst="rect">
+            <a:avLst/>
+          </a:prstGeom>
+          <a:noFill/>
+        </p:spPr>
+        <p:txBody>
+          <a:bodyPr wrap="none" rtlCol="0">
+            <a:spAutoFit/>
+          </a:bodyPr>
+          <a:lstStyle/>
+          <a:p>
+            <a:r>
+              <a:rPr lang="pt-PT" sz="4000" dirty="0" smtClean="0">
+                <a:effectLst>
+                  <a:outerShdw blurRad="38100" dist="38100" dir="2700000" algn="tl">
+                    <a:srgbClr val="000000">
+                      <a:alpha val="43137"/>
+                    </a:srgbClr>
+                  </a:outerShdw>
+                </a:effectLst>
+                <a:latin typeface="Helvetica35-Thin" pitchFamily="34" charset="0"/>
+              </a:rPr>
+              <a:t>“</a:t>
+            </a:r>
+            <a:r>
+              <a:rPr lang="pt-PT" sz="5400" dirty="0" smtClean="0">
+                <a:effectLst>
+                  <a:outerShdw blurRad="38100" dist="38100" dir="2700000" algn="tl">
+                    <a:srgbClr val="000000">
+                      <a:alpha val="43137"/>
+                    </a:srgbClr>
+                  </a:outerShdw>
+                </a:effectLst>
+                <a:latin typeface="Helvetica35-Thin" pitchFamily="34" charset="0"/>
+              </a:rPr>
+              <a:t>LOVE</a:t>
+            </a:r>
+            <a:r>
+              <a:rPr lang="pt-PT" sz="4000" dirty="0" smtClean="0">
+                <a:effectLst>
+                  <a:outerShdw blurRad="38100" dist="38100" dir="2700000" algn="tl">
+                    <a:srgbClr val="000000">
+                      <a:alpha val="43137"/>
+                    </a:srgbClr>
+                  </a:outerShdw>
+                </a:effectLst>
+                <a:latin typeface="Helvetica35-Thin" pitchFamily="34" charset="0"/>
+              </a:rPr>
+              <a:t>”</a:t>
+            </a:r>
+            <a:endParaRPr lang="pt-PT" sz="4000" dirty="0">
+              <a:effectLst>
+                <a:outerShdw blurRad="38100" dist="38100" dir="2700000" algn="tl">
+                  <a:srgbClr val="000000">
+                    <a:alpha val="43137"/>
+                  </a:srgbClr>
+                </a:outerShdw>
+              </a:effectLst>
+              <a:latin typeface="Helvetica35-Thin" pitchFamily="34" charset="0"/>
+            </a:endParaRPr>
+          </a:p>
+        </p:txBody>
+      </p:sp>
+      <p:sp>
+        <p:nvSpPr>
+          <p:cNvPr id="8" name="CaixaDeTexto 7"/>
+          <p:cNvSpPr txBox="1"/>
+          <p:nvPr/>
+        </p:nvSpPr>
+        <p:spPr>
+          <a:xfrm>
+            <a:off x="1259632" y="3128119"/>
+            <a:ext cx="1888659" cy="707886"/>
+          </a:xfrm>
+          <a:prstGeom prst="rect">
+            <a:avLst/>
+          </a:prstGeom>
+          <a:noFill/>
+        </p:spPr>
+        <p:txBody>
+          <a:bodyPr wrap="none" rtlCol="0">
+            <a:spAutoFit/>
+          </a:bodyPr>
+          <a:lstStyle/>
+          <a:p>
+            <a:r>
+              <a:rPr lang="pt-PT" sz="4000" dirty="0" smtClean="0">
+                <a:effectLst>
+                  <a:outerShdw blurRad="38100" dist="38100" dir="2700000" algn="tl">
+                    <a:srgbClr val="000000">
+                      <a:alpha val="43137"/>
+                    </a:srgbClr>
+                  </a:outerShdw>
+                </a:effectLst>
+                <a:latin typeface="Helvetica35-Thin" pitchFamily="34" charset="0"/>
+              </a:rPr>
+              <a:t>“ROCK”</a:t>
+            </a:r>
+            <a:endParaRPr lang="pt-PT" sz="4000" dirty="0">
+              <a:effectLst>
+                <a:outerShdw blurRad="38100" dist="38100" dir="2700000" algn="tl">
+                  <a:srgbClr val="000000">
+                    <a:alpha val="43137"/>
+                  </a:srgbClr>
+                </a:outerShdw>
+              </a:effectLst>
+              <a:latin typeface="Helvetica35-Thin" pitchFamily="34" charset="0"/>
+            </a:endParaRPr>
+          </a:p>
+        </p:txBody>
+      </p:sp>
+      <p:sp>
+        <p:nvSpPr>
+          <p:cNvPr id="9" name="CaixaDeTexto 8"/>
+          <p:cNvSpPr txBox="1"/>
+          <p:nvPr/>
+        </p:nvSpPr>
+        <p:spPr>
+          <a:xfrm>
+            <a:off x="5364088" y="4017258"/>
+            <a:ext cx="1494320" cy="707886"/>
+          </a:xfrm>
+          <a:prstGeom prst="rect">
+            <a:avLst/>
+          </a:prstGeom>
+          <a:noFill/>
+        </p:spPr>
+        <p:txBody>
+          <a:bodyPr wrap="none" rtlCol="0">
+            <a:spAutoFit/>
+          </a:bodyPr>
+          <a:lstStyle/>
+          <a:p>
+            <a:r>
+              <a:rPr lang="pt-PT" sz="4000" dirty="0" smtClean="0">
+                <a:effectLst>
+                  <a:outerShdw blurRad="38100" dist="38100" dir="2700000" algn="tl">
+                    <a:srgbClr val="000000">
+                      <a:alpha val="43137"/>
+                    </a:srgbClr>
+                  </a:outerShdw>
+                </a:effectLst>
+                <a:latin typeface="Helvetica35-Thin" pitchFamily="34" charset="0"/>
+              </a:rPr>
+              <a:t>“POP”</a:t>
+            </a:r>
+            <a:endParaRPr lang="pt-PT" sz="4000" dirty="0">
+              <a:effectLst>
+                <a:outerShdw blurRad="38100" dist="38100" dir="2700000" algn="tl">
+                  <a:srgbClr val="000000">
+                    <a:alpha val="43137"/>
+                  </a:srgbClr>
+                </a:outerShdw>
+              </a:effectLst>
+              <a:latin typeface="Helvetica35-Thin" pitchFamily="34" charset="0"/>
+            </a:endParaRPr>
+          </a:p>
+        </p:txBody>
+      </p:sp>
+      <p:sp>
+        <p:nvSpPr>
+          <p:cNvPr id="10" name="CaixaDeTexto 9"/>
+          <p:cNvSpPr txBox="1"/>
+          <p:nvPr/>
+        </p:nvSpPr>
+        <p:spPr>
+          <a:xfrm>
+            <a:off x="2885744" y="3632345"/>
+            <a:ext cx="1890261" cy="707886"/>
+          </a:xfrm>
+          <a:prstGeom prst="rect">
+            <a:avLst/>
+          </a:prstGeom>
+          <a:noFill/>
+        </p:spPr>
+        <p:txBody>
+          <a:bodyPr wrap="none" rtlCol="0">
+            <a:spAutoFit/>
+          </a:bodyPr>
+          <a:lstStyle/>
+          <a:p>
+            <a:r>
+              <a:rPr lang="pt-PT" sz="4000" dirty="0" smtClean="0">
+                <a:effectLst>
+                  <a:outerShdw blurRad="38100" dist="38100" dir="2700000" algn="tl">
+                    <a:srgbClr val="000000">
+                      <a:alpha val="43137"/>
+                    </a:srgbClr>
+                  </a:outerShdw>
+                </a:effectLst>
+                <a:latin typeface="Helvetica35-Thin" pitchFamily="34" charset="0"/>
+              </a:rPr>
+              <a:t>AC/DC”</a:t>
+            </a:r>
+            <a:endParaRPr lang="pt-PT" sz="4000" dirty="0">
+              <a:effectLst>
+                <a:outerShdw blurRad="38100" dist="38100" dir="2700000" algn="tl">
+                  <a:srgbClr val="000000">
+                    <a:alpha val="43137"/>
+                  </a:srgbClr>
+                </a:outerShdw>
+              </a:effectLst>
+              <a:latin typeface="Helvetica35-Thin" pitchFamily="34" charset="0"/>
+            </a:endParaRPr>
+          </a:p>
+        </p:txBody>
+      </p:sp>
+      <p:sp>
+        <p:nvSpPr>
+          <p:cNvPr id="11" name="CaixaDeTexto 10"/>
+          <p:cNvSpPr txBox="1"/>
+          <p:nvPr/>
+        </p:nvSpPr>
+        <p:spPr>
+          <a:xfrm>
+            <a:off x="7014586" y="3128119"/>
+            <a:ext cx="1527982" cy="707886"/>
+          </a:xfrm>
+          <a:prstGeom prst="rect">
+            <a:avLst/>
+          </a:prstGeom>
+          <a:noFill/>
+        </p:spPr>
+        <p:txBody>
+          <a:bodyPr wrap="none" rtlCol="0">
+            <a:spAutoFit/>
+          </a:bodyPr>
+          <a:lstStyle/>
+          <a:p>
+            <a:r>
+              <a:rPr lang="pt-PT" sz="4000" dirty="0" smtClean="0">
+                <a:effectLst>
+                  <a:outerShdw blurRad="38100" dist="38100" dir="2700000" algn="tl">
+                    <a:srgbClr val="000000">
+                      <a:alpha val="43137"/>
+                    </a:srgbClr>
+                  </a:outerShdw>
+                </a:effectLst>
+                <a:latin typeface="Helvetica35-Thin" pitchFamily="34" charset="0"/>
+              </a:rPr>
+              <a:t>“YOU”</a:t>
+            </a:r>
+            <a:endParaRPr lang="pt-PT" sz="4000" dirty="0">
+              <a:effectLst>
+                <a:outerShdw blurRad="38100" dist="38100" dir="2700000" algn="tl">
+                  <a:srgbClr val="000000">
+                    <a:alpha val="43137"/>
+                  </a:srgbClr>
+                </a:outerShdw>
+              </a:effectLst>
+              <a:latin typeface="Helvetica35-Thin" pitchFamily="34" charset="0"/>
+            </a:endParaRPr>
+          </a:p>
+        </p:txBody>
+      </p:sp>
+      <p:sp>
+        <p:nvSpPr>
+          <p:cNvPr id="12" name="CaixaDeTexto 11"/>
+          <p:cNvSpPr txBox="1"/>
+          <p:nvPr/>
+        </p:nvSpPr>
+        <p:spPr>
+          <a:xfrm>
+            <a:off x="1664517" y="5097378"/>
+            <a:ext cx="1611339" cy="707886"/>
+          </a:xfrm>
+          <a:prstGeom prst="rect">
+            <a:avLst/>
+          </a:prstGeom>
+          <a:noFill/>
+        </p:spPr>
+        <p:txBody>
+          <a:bodyPr wrap="none" rtlCol="0">
+            <a:spAutoFit/>
+          </a:bodyPr>
+          <a:lstStyle/>
+          <a:p>
+            <a:r>
+              <a:rPr lang="pt-PT" sz="4000" dirty="0" smtClean="0">
+                <a:effectLst>
+                  <a:outerShdw blurRad="38100" dist="38100" dir="2700000" algn="tl">
+                    <a:srgbClr val="000000">
+                      <a:alpha val="43137"/>
+                    </a:srgbClr>
+                  </a:outerShdw>
+                </a:effectLst>
+                <a:latin typeface="Helvetica35-Thin" pitchFamily="34" charset="0"/>
+              </a:rPr>
+              <a:t>“JAZZ”</a:t>
+            </a:r>
+            <a:endParaRPr lang="pt-PT" sz="4000" dirty="0">
+              <a:effectLst>
+                <a:outerShdw blurRad="38100" dist="38100" dir="2700000" algn="tl">
+                  <a:srgbClr val="000000">
+                    <a:alpha val="43137"/>
+                  </a:srgbClr>
+                </a:outerShdw>
+              </a:effectLst>
+              <a:latin typeface="Helvetica35-Thin" pitchFamily="34" charset="0"/>
+            </a:endParaRPr>
+          </a:p>
+        </p:txBody>
+      </p:sp>
+      <p:sp>
+        <p:nvSpPr>
+          <p:cNvPr id="13" name="CaixaDeTexto 12"/>
+          <p:cNvSpPr txBox="1"/>
+          <p:nvPr/>
+        </p:nvSpPr>
+        <p:spPr>
+          <a:xfrm>
+            <a:off x="3799267" y="5257582"/>
+            <a:ext cx="1499128" cy="707886"/>
+          </a:xfrm>
+          <a:prstGeom prst="rect">
+            <a:avLst/>
+          </a:prstGeom>
+          <a:noFill/>
+        </p:spPr>
+        <p:txBody>
+          <a:bodyPr wrap="none" rtlCol="0">
+            <a:spAutoFit/>
+          </a:bodyPr>
+          <a:lstStyle/>
+          <a:p>
+            <a:r>
+              <a:rPr lang="pt-PT" sz="4000" dirty="0" smtClean="0">
+                <a:effectLst>
+                  <a:outerShdw blurRad="38100" dist="38100" dir="2700000" algn="tl">
+                    <a:srgbClr val="000000">
+                      <a:alpha val="43137"/>
+                    </a:srgbClr>
+                  </a:outerShdw>
+                </a:effectLst>
+                <a:latin typeface="Helvetica35-Thin" pitchFamily="34" charset="0"/>
+              </a:rPr>
+              <a:t>“HOT”</a:t>
+            </a:r>
+            <a:endParaRPr lang="pt-PT" sz="4000" dirty="0">
+              <a:effectLst>
+                <a:outerShdw blurRad="38100" dist="38100" dir="2700000" algn="tl">
+                  <a:srgbClr val="000000">
+                    <a:alpha val="43137"/>
+                  </a:srgbClr>
+                </a:outerShdw>
+              </a:effectLst>
+              <a:latin typeface="Helvetica35-Thin" pitchFamily="34" charset="0"/>
+            </a:endParaRPr>
+          </a:p>
+        </p:txBody>
+      </p:sp>
+      <p:sp>
+        <p:nvSpPr>
+          <p:cNvPr id="14" name="CaixaDeTexto 13"/>
+          <p:cNvSpPr txBox="1"/>
+          <p:nvPr/>
+        </p:nvSpPr>
+        <p:spPr>
+          <a:xfrm>
+            <a:off x="6386664" y="5313402"/>
+            <a:ext cx="2271776" cy="707886"/>
+          </a:xfrm>
+          <a:prstGeom prst="rect">
+            <a:avLst/>
+          </a:prstGeom>
+          <a:noFill/>
+        </p:spPr>
+        <p:txBody>
+          <a:bodyPr wrap="none" rtlCol="0">
+            <a:spAutoFit/>
+          </a:bodyPr>
+          <a:lstStyle/>
+          <a:p>
+            <a:r>
+              <a:rPr lang="pt-PT" sz="4000" dirty="0" smtClean="0">
+                <a:effectLst>
+                  <a:outerShdw blurRad="38100" dist="38100" dir="2700000" algn="tl">
+                    <a:srgbClr val="000000">
+                      <a:alpha val="43137"/>
+                    </a:srgbClr>
+                  </a:outerShdw>
+                </a:effectLst>
+                <a:latin typeface="Helvetica35-Thin" pitchFamily="34" charset="0"/>
+              </a:rPr>
+              <a:t>“JARDEL”</a:t>
+            </a:r>
+            <a:endParaRPr lang="pt-PT" sz="4000" dirty="0">
+              <a:effectLst>
+                <a:outerShdw blurRad="38100" dist="38100" dir="2700000" algn="tl">
+                  <a:srgbClr val="000000">
+                    <a:alpha val="43137"/>
+                  </a:srgbClr>
+                </a:outerShdw>
+              </a:effectLst>
+              <a:latin typeface="Helvetica35-Thin" pitchFamily="34" charset="0"/>
+            </a:endParaRPr>
+          </a:p>
+        </p:txBody>
+      </p:sp>
+    </p:spTree>
+    <p:extLst>
+      <p:ext uri="{BB962C8B-B14F-4D97-AF65-F5344CB8AC3E}">
+        <p14:creationId xmlns:p14="http://schemas.microsoft.com/office/powerpoint/2010/main" val="4243904927"/>
+      </p:ext>
+    </p:extLst>
+  </p:cSld>
+  <p:clrMapOvr>
+    <a:masterClrMapping/>
+  </p:clrMapOvr>
+  <p:timing>
+    <p:tnLst>
+      <p:par>
+        <p:cTn id="1" dur="indefinite" restart="never" nodeType="tmRoot"/>
+      </p:par>
+    </p:tnLst>
+  </p:timing>
+</p:sld>
+</file>
+
+<file path=ppt/slides/slide15.xml><?xml version="1.0" encoding="utf-8"?>
+<p:sld xmlns:a="http://schemas.openxmlformats.org/drawingml/2006/main" xmlns:r="http://schemas.openxmlformats.org/officeDocument/2006/relationships" xmlns:p="http://schemas.openxmlformats.org/presentationml/2006/main">
+  <p:cSld>
+    <p:spTree>
+      <p:nvGrpSpPr>
+        <p:cNvPr id="1" name=""/>
+        <p:cNvGrpSpPr/>
+        <p:nvPr/>
+      </p:nvGrpSpPr>
+      <p:grpSpPr>
+        <a:xfrm>
+          <a:off x="0" y="0"/>
+          <a:ext cx="0" cy="0"/>
+          <a:chOff x="0" y="0"/>
+          <a:chExt cx="0" cy="0"/>
+        </a:xfrm>
+      </p:grpSpPr>
+      <p:pic>
+        <p:nvPicPr>
+          <p:cNvPr id="11266" name="Picture 2" descr="http://images.trulia.com/blogimg/9/6/f/8/382213_1351105488124_o.jpg"/>
+          <p:cNvPicPr>
+            <a:picLocks noChangeAspect="1" noChangeArrowheads="1"/>
+          </p:cNvPicPr>
+          <p:nvPr/>
+        </p:nvPicPr>
+        <p:blipFill>
+          <a:blip r:embed="rId2">
+            <a:extLst>
+              <a:ext uri="{28A0092B-C50C-407E-A947-70E740481C1C}">
+                <a14:useLocalDpi xmlns:a14="http://schemas.microsoft.com/office/drawing/2010/main" val="0"/>
+              </a:ext>
+            </a:extLst>
+          </a:blip>
+          <a:srcRect/>
+          <a:stretch>
+            <a:fillRect/>
+          </a:stretch>
+        </p:blipFill>
+        <p:spPr bwMode="auto">
+          <a:xfrm>
+            <a:off x="-23390" y="0"/>
+            <a:ext cx="9144000" cy="6858000"/>
+          </a:xfrm>
+          <a:prstGeom prst="rect">
+            <a:avLst/>
+          </a:prstGeom>
+          <a:noFill/>
+          <a:extLst>
+            <a:ext uri="{909E8E84-426E-40DD-AFC4-6F175D3DCCD1}">
+              <a14:hiddenFill xmlns:a14="http://schemas.microsoft.com/office/drawing/2010/main">
+                <a:solidFill>
+                  <a:srgbClr val="FFFFFF"/>
+                </a:solidFill>
+              </a14:hiddenFill>
+            </a:ext>
+          </a:extLst>
+        </p:spPr>
+      </p:pic>
+    </p:spTree>
+    <p:extLst>
+      <p:ext uri="{BB962C8B-B14F-4D97-AF65-F5344CB8AC3E}">
+        <p14:creationId xmlns:p14="http://schemas.microsoft.com/office/powerpoint/2010/main" val="2281466564"/>
+      </p:ext>
+    </p:extLst>
+  </p:cSld>
+  <p:clrMapOvr>
+    <a:masterClrMapping/>
+  </p:clrMapOvr>
+  <p:timing>
+    <p:tnLst>
+      <p:par>
+        <p:cTn id="1" dur="indefinite" restart="never" nodeType="tmRoot"/>
+      </p:par>
+    </p:tnLst>
+  </p:timing>
+</p:sld>
+</file>
+
 <file path=ppt/slides/slide2.xml><?xml version="1.0" encoding="utf-8"?>
 <p:sld xmlns:a="http://schemas.openxmlformats.org/drawingml/2006/main" xmlns:r="http://schemas.openxmlformats.org/officeDocument/2006/relationships" xmlns:p="http://schemas.openxmlformats.org/presentationml/2006/main">
   <p:cSld>
@@ -5859,9 +6904,9 @@
         <p:grpSpPr>
           <a:xfrm>
             <a:off x="899592" y="1126255"/>
-            <a:ext cx="7541780" cy="1654673"/>
+            <a:ext cx="7862380" cy="1654673"/>
             <a:chOff x="899592" y="980728"/>
-            <a:chExt cx="7541780" cy="1654673"/>
+            <a:chExt cx="7862380" cy="1654673"/>
           </a:xfrm>
         </p:grpSpPr>
         <p:sp>
@@ -5931,7 +6976,7 @@
           <p:spPr>
             <a:xfrm>
               <a:off x="1918432" y="1804404"/>
-              <a:ext cx="6522940" cy="830997"/>
+              <a:ext cx="6843540" cy="830997"/>
             </a:xfrm>
             <a:prstGeom prst="rect">
               <a:avLst/>
@@ -5999,10 +7044,10 @@
                 <a:t> </a:t>
               </a:r>
               <a:r>
-                <a:rPr lang="pt-PT" sz="4800" dirty="0" err="1" smtClean="0">
+                <a:rPr lang="pt-PT" sz="4800" dirty="0" smtClean="0">
                   <a:latin typeface="Helvetica35-Thin" pitchFamily="34" charset="0"/>
                 </a:rPr>
-                <a:t>indexs</a:t>
+                <a:t>indexes</a:t>
               </a:r>
               <a:endParaRPr lang="pt-PT" sz="4000" dirty="0">
                 <a:latin typeface="Helvetica35-Thin" pitchFamily="34" charset="0"/>
@@ -6096,7 +7141,7 @@
         <p:spPr>
           <a:xfrm>
             <a:off x="3563888" y="1966192"/>
-            <a:ext cx="4544514" cy="830997"/>
+            <a:ext cx="4783361" cy="830997"/>
           </a:xfrm>
           <a:prstGeom prst="rect">
             <a:avLst/>
@@ -6120,8 +7165,31 @@
                 </a:effectLst>
                 <a:latin typeface="Helvetica35-Thin" pitchFamily="34" charset="0"/>
               </a:rPr>
-              <a:t>INDEX CRIATION</a:t>
-            </a:r>
+              <a:t>INDEX </a:t>
+            </a:r>
+            <a:r>
+              <a:rPr lang="pt-PT" sz="4800" dirty="0" smtClean="0">
+                <a:effectLst>
+                  <a:outerShdw blurRad="38100" dist="38100" dir="2700000" algn="tl">
+                    <a:srgbClr val="000000">
+                      <a:alpha val="43137"/>
+                    </a:srgbClr>
+                  </a:outerShdw>
+                </a:effectLst>
+                <a:latin typeface="Helvetica35-Thin" pitchFamily="34" charset="0"/>
+              </a:rPr>
+              <a:t>CREATION</a:t>
+            </a:r>
+            <a:endParaRPr lang="pt-PT" sz="4800" dirty="0" smtClean="0">
+              <a:effectLst>
+                <a:outerShdw blurRad="38100" dist="38100" dir="2700000" algn="tl">
+                  <a:srgbClr val="000000">
+                    <a:alpha val="43137"/>
+                  </a:srgbClr>
+                </a:outerShdw>
+              </a:effectLst>
+              <a:latin typeface="Helvetica35-Thin" pitchFamily="34" charset="0"/>
+            </a:endParaRPr>
           </a:p>
         </p:txBody>
       </p:sp>

</xml_diff>